<commit_message>
updating support for audition
</commit_message>
<xml_diff>
--- a/Ressources/presentation_projet_connect.pptx
+++ b/Ressources/presentation_projet_connect.pptx
@@ -10,8 +10,13 @@
     <p:sldId id="262" r:id="rId4"/>
     <p:sldId id="260" r:id="rId5"/>
     <p:sldId id="261" r:id="rId6"/>
-    <p:sldId id="258" r:id="rId7"/>
-    <p:sldId id="259" r:id="rId8"/>
+    <p:sldId id="263" r:id="rId7"/>
+    <p:sldId id="264" r:id="rId8"/>
+    <p:sldId id="265" r:id="rId9"/>
+    <p:sldId id="266" r:id="rId10"/>
+    <p:sldId id="267" r:id="rId11"/>
+    <p:sldId id="258" r:id="rId12"/>
+    <p:sldId id="259" r:id="rId13"/>
   </p:sldIdLst>
   <p:sldSz cx="12192000" cy="6858000"/>
   <p:notesSz cx="6858000" cy="9144000"/>
@@ -3338,10 +3343,10 @@
       </p:grpSpPr>
       <p:pic>
         <p:nvPicPr>
-          <p:cNvPr id="7" name="Image 6">
-            <a:extLst>
-              <a:ext uri="{FF2B5EF4-FFF2-40B4-BE49-F238E27FC236}">
-                <a16:creationId xmlns:a16="http://schemas.microsoft.com/office/drawing/2014/main" id="{167A63C3-3A89-4803-96B3-B87D483E511B}"/>
+          <p:cNvPr id="12" name="Image 11">
+            <a:extLst>
+              <a:ext uri="{FF2B5EF4-FFF2-40B4-BE49-F238E27FC236}">
+                <a16:creationId xmlns:a16="http://schemas.microsoft.com/office/drawing/2014/main" id="{EABA5552-B898-4432-AF43-37180D855AB5}"/>
               </a:ext>
             </a:extLst>
           </p:cNvPr>
@@ -3364,8 +3369,8 @@
         </p:blipFill>
         <p:spPr>
           <a:xfrm>
-            <a:off x="8327206" y="386829"/>
-            <a:ext cx="1710365" cy="3042169"/>
+            <a:off x="7063570" y="147219"/>
+            <a:ext cx="1996043" cy="4079876"/>
           </a:xfrm>
           <a:prstGeom prst="rect">
             <a:avLst/>
@@ -3399,10 +3404,14 @@
           <a:lstStyle/>
           <a:p>
             <a:r>
-              <a:rPr lang="fr-FR" dirty="0" err="1"/>
+              <a:rPr lang="fr-FR" dirty="0" err="1">
+                <a:latin typeface="Helvetica-Light" panose="020B0400000000000000" pitchFamily="34" charset="0"/>
+              </a:rPr>
               <a:t>Connect</a:t>
             </a:r>
-            <a:endParaRPr lang="fr-FR" dirty="0"/>
+            <a:endParaRPr lang="fr-FR" dirty="0">
+              <a:latin typeface="Helvetica-Light" panose="020B0400000000000000" pitchFamily="34" charset="0"/>
+            </a:endParaRPr>
           </a:p>
         </p:txBody>
       </p:sp>
@@ -3433,13 +3442,17 @@
           <a:lstStyle/>
           <a:p>
             <a:r>
-              <a:rPr lang="fr-FR" dirty="0"/>
+              <a:rPr lang="fr-FR" dirty="0">
+                <a:latin typeface="Helvetica-Light" panose="020B0400000000000000" pitchFamily="34" charset="0"/>
+              </a:rPr>
               <a:t>NIJEAN Jordan</a:t>
             </a:r>
           </a:p>
           <a:p>
             <a:r>
-              <a:rPr lang="fr-FR" dirty="0"/>
+              <a:rPr lang="fr-FR" dirty="0">
+                <a:latin typeface="Helvetica-Light" panose="020B0400000000000000" pitchFamily="34" charset="0"/>
+              </a:rPr>
               <a:t>UREN Can Serkan</a:t>
             </a:r>
           </a:p>
@@ -3447,10 +3460,10 @@
       </p:sp>
       <p:pic>
         <p:nvPicPr>
-          <p:cNvPr id="9" name="Image 8">
-            <a:extLst>
-              <a:ext uri="{FF2B5EF4-FFF2-40B4-BE49-F238E27FC236}">
-                <a16:creationId xmlns:a16="http://schemas.microsoft.com/office/drawing/2014/main" id="{FBD2BE22-E864-4E6E-AF5C-3E0D21601F70}"/>
+          <p:cNvPr id="10" name="Image 9">
+            <a:extLst>
+              <a:ext uri="{FF2B5EF4-FFF2-40B4-BE49-F238E27FC236}">
+                <a16:creationId xmlns:a16="http://schemas.microsoft.com/office/drawing/2014/main" id="{675634DD-1AFC-4E84-9E74-640FE6B16B17}"/>
               </a:ext>
             </a:extLst>
           </p:cNvPr>
@@ -3473,8 +3486,8 @@
         </p:blipFill>
         <p:spPr>
           <a:xfrm>
-            <a:off x="9182389" y="1907914"/>
-            <a:ext cx="1710365" cy="3042171"/>
+            <a:off x="8242198" y="1493424"/>
+            <a:ext cx="1996043" cy="4079875"/>
           </a:xfrm>
           <a:prstGeom prst="rect">
             <a:avLst/>
@@ -3483,10 +3496,10 @@
       </p:pic>
       <p:pic>
         <p:nvPicPr>
-          <p:cNvPr id="5" name="Image 4">
-            <a:extLst>
-              <a:ext uri="{FF2B5EF4-FFF2-40B4-BE49-F238E27FC236}">
-                <a16:creationId xmlns:a16="http://schemas.microsoft.com/office/drawing/2014/main" id="{5DF2CFEF-FDF2-4528-A6C9-F6664C13980B}"/>
+          <p:cNvPr id="6" name="Image 5">
+            <a:extLst>
+              <a:ext uri="{FF2B5EF4-FFF2-40B4-BE49-F238E27FC236}">
+                <a16:creationId xmlns:a16="http://schemas.microsoft.com/office/drawing/2014/main" id="{F5E96A58-268D-42B9-B6EA-15530B6D4650}"/>
               </a:ext>
             </a:extLst>
           </p:cNvPr>
@@ -3509,8 +3522,8 @@
         </p:blipFill>
         <p:spPr>
           <a:xfrm>
-            <a:off x="10033307" y="3233070"/>
-            <a:ext cx="1718895" cy="3042171"/>
+            <a:off x="9669978" y="2707238"/>
+            <a:ext cx="1996043" cy="4079875"/>
           </a:xfrm>
           <a:prstGeom prst="rect">
             <a:avLst/>
@@ -3521,6 +3534,364 @@
     <p:extLst>
       <p:ext uri="{BB962C8B-B14F-4D97-AF65-F5344CB8AC3E}">
         <p14:creationId xmlns:p14="http://schemas.microsoft.com/office/powerpoint/2010/main" val="3061064769"/>
+      </p:ext>
+    </p:extLst>
+  </p:cSld>
+  <p:clrMapOvr>
+    <a:masterClrMapping/>
+  </p:clrMapOvr>
+</p:sld>
+</file>
+
+<file path=ppt/slides/slide10.xml><?xml version="1.0" encoding="utf-8"?>
+<p:sld xmlns:a="http://schemas.openxmlformats.org/drawingml/2006/main" xmlns:r="http://schemas.openxmlformats.org/officeDocument/2006/relationships" xmlns:p="http://schemas.openxmlformats.org/presentationml/2006/main">
+  <p:cSld>
+    <p:spTree>
+      <p:nvGrpSpPr>
+        <p:cNvPr id="1" name=""/>
+        <p:cNvGrpSpPr/>
+        <p:nvPr/>
+      </p:nvGrpSpPr>
+      <p:grpSpPr>
+        <a:xfrm>
+          <a:off x="0" y="0"/>
+          <a:ext cx="0" cy="0"/>
+          <a:chOff x="0" y="0"/>
+          <a:chExt cx="0" cy="0"/>
+        </a:xfrm>
+      </p:grpSpPr>
+      <p:sp>
+        <p:nvSpPr>
+          <p:cNvPr id="2" name="Titre 1">
+            <a:extLst>
+              <a:ext uri="{FF2B5EF4-FFF2-40B4-BE49-F238E27FC236}">
+                <a16:creationId xmlns:a16="http://schemas.microsoft.com/office/drawing/2014/main" id="{D0B0AC82-1BA4-4F15-8FF4-079A6CFA9750}"/>
+              </a:ext>
+            </a:extLst>
+          </p:cNvPr>
+          <p:cNvSpPr>
+            <a:spLocks noGrp="1"/>
+          </p:cNvSpPr>
+          <p:nvPr>
+            <p:ph type="title"/>
+          </p:nvPr>
+        </p:nvSpPr>
+        <p:spPr/>
+        <p:txBody>
+          <a:bodyPr/>
+          <a:lstStyle/>
+          <a:p>
+            <a:pPr algn="ctr"/>
+            <a:r>
+              <a:rPr lang="fr-FR" dirty="0"/>
+              <a:t>Fonctionnalités</a:t>
+            </a:r>
+          </a:p>
+        </p:txBody>
+      </p:sp>
+      <p:sp>
+        <p:nvSpPr>
+          <p:cNvPr id="3" name="Espace réservé du contenu 2">
+            <a:extLst>
+              <a:ext uri="{FF2B5EF4-FFF2-40B4-BE49-F238E27FC236}">
+                <a16:creationId xmlns:a16="http://schemas.microsoft.com/office/drawing/2014/main" id="{74D41573-F310-4C80-8827-7ED40DEB453B}"/>
+              </a:ext>
+            </a:extLst>
+          </p:cNvPr>
+          <p:cNvSpPr>
+            <a:spLocks noGrp="1"/>
+          </p:cNvSpPr>
+          <p:nvPr>
+            <p:ph idx="1"/>
+          </p:nvPr>
+        </p:nvSpPr>
+        <p:spPr/>
+        <p:txBody>
+          <a:bodyPr/>
+          <a:lstStyle/>
+          <a:p>
+            <a:r>
+              <a:rPr lang="fr-FR" dirty="0">
+                <a:latin typeface="Helvetica-Light" panose="020B0400000000000000" pitchFamily="34" charset="0"/>
+              </a:rPr>
+              <a:t>Appel vidéo</a:t>
+            </a:r>
+          </a:p>
+        </p:txBody>
+      </p:sp>
+    </p:spTree>
+    <p:extLst>
+      <p:ext uri="{BB962C8B-B14F-4D97-AF65-F5344CB8AC3E}">
+        <p14:creationId xmlns:p14="http://schemas.microsoft.com/office/powerpoint/2010/main" val="3734181321"/>
+      </p:ext>
+    </p:extLst>
+  </p:cSld>
+  <p:clrMapOvr>
+    <a:masterClrMapping/>
+  </p:clrMapOvr>
+</p:sld>
+</file>
+
+<file path=ppt/slides/slide11.xml><?xml version="1.0" encoding="utf-8"?>
+<p:sld xmlns:a="http://schemas.openxmlformats.org/drawingml/2006/main" xmlns:r="http://schemas.openxmlformats.org/officeDocument/2006/relationships" xmlns:p="http://schemas.openxmlformats.org/presentationml/2006/main">
+  <p:cSld>
+    <p:spTree>
+      <p:nvGrpSpPr>
+        <p:cNvPr id="1" name=""/>
+        <p:cNvGrpSpPr/>
+        <p:nvPr/>
+      </p:nvGrpSpPr>
+      <p:grpSpPr>
+        <a:xfrm>
+          <a:off x="0" y="0"/>
+          <a:ext cx="0" cy="0"/>
+          <a:chOff x="0" y="0"/>
+          <a:chExt cx="0" cy="0"/>
+        </a:xfrm>
+      </p:grpSpPr>
+      <p:sp>
+        <p:nvSpPr>
+          <p:cNvPr id="2" name="Titre 1">
+            <a:extLst>
+              <a:ext uri="{FF2B5EF4-FFF2-40B4-BE49-F238E27FC236}">
+                <a16:creationId xmlns:a16="http://schemas.microsoft.com/office/drawing/2014/main" id="{ABD0262C-D8DE-4C52-A37C-0E08629F491D}"/>
+              </a:ext>
+            </a:extLst>
+          </p:cNvPr>
+          <p:cNvSpPr>
+            <a:spLocks noGrp="1"/>
+          </p:cNvSpPr>
+          <p:nvPr>
+            <p:ph type="title"/>
+          </p:nvPr>
+        </p:nvSpPr>
+        <p:spPr/>
+        <p:txBody>
+          <a:bodyPr/>
+          <a:lstStyle/>
+          <a:p>
+            <a:pPr algn="ctr"/>
+            <a:r>
+              <a:rPr lang="fr-FR" dirty="0">
+                <a:latin typeface="Helvetica-Light" panose="020B0400000000000000" pitchFamily="34" charset="0"/>
+              </a:rPr>
+              <a:t>Intérêts</a:t>
+            </a:r>
+          </a:p>
+        </p:txBody>
+      </p:sp>
+      <p:sp>
+        <p:nvSpPr>
+          <p:cNvPr id="3" name="Espace réservé du contenu 2">
+            <a:extLst>
+              <a:ext uri="{FF2B5EF4-FFF2-40B4-BE49-F238E27FC236}">
+                <a16:creationId xmlns:a16="http://schemas.microsoft.com/office/drawing/2014/main" id="{B97000C7-769B-4C59-A947-B9CAB3D7756B}"/>
+              </a:ext>
+            </a:extLst>
+          </p:cNvPr>
+          <p:cNvSpPr>
+            <a:spLocks noGrp="1"/>
+          </p:cNvSpPr>
+          <p:nvPr>
+            <p:ph idx="1"/>
+          </p:nvPr>
+        </p:nvSpPr>
+        <p:spPr/>
+        <p:txBody>
+          <a:bodyPr/>
+          <a:lstStyle/>
+          <a:p>
+            <a:r>
+              <a:rPr lang="fr-FR" dirty="0">
+                <a:latin typeface="Helvetica-Light" panose="020B0400000000000000" pitchFamily="34" charset="0"/>
+              </a:rPr>
+              <a:t> Chat </a:t>
+            </a:r>
+            <a:r>
+              <a:rPr lang="fr-FR" dirty="0" err="1">
+                <a:latin typeface="Helvetica-Light" panose="020B0400000000000000" pitchFamily="34" charset="0"/>
+              </a:rPr>
+              <a:t>éphèmère</a:t>
+            </a:r>
+            <a:r>
+              <a:rPr lang="fr-FR" dirty="0">
+                <a:latin typeface="Helvetica-Light" panose="020B0400000000000000" pitchFamily="34" charset="0"/>
+              </a:rPr>
+              <a:t>  :</a:t>
+            </a:r>
+          </a:p>
+          <a:p>
+            <a:pPr marL="0" indent="0">
+              <a:buNone/>
+            </a:pPr>
+            <a:r>
+              <a:rPr lang="fr-FR" dirty="0">
+                <a:latin typeface="Helvetica-Light" panose="020B0400000000000000" pitchFamily="34" charset="0"/>
+              </a:rPr>
+              <a:t>	- Mobilise l’attention de l’utilisateur </a:t>
+            </a:r>
+          </a:p>
+          <a:p>
+            <a:r>
+              <a:rPr lang="fr-FR" dirty="0">
+                <a:latin typeface="Helvetica-Light" panose="020B0400000000000000" pitchFamily="34" charset="0"/>
+              </a:rPr>
+              <a:t>Objectif principal : mettre en place un moyen de communication simple et sans contrainte</a:t>
+            </a:r>
+          </a:p>
+          <a:p>
+            <a:r>
+              <a:rPr lang="fr-FR" dirty="0">
+                <a:latin typeface="Helvetica-Light" panose="020B0400000000000000" pitchFamily="34" charset="0"/>
+              </a:rPr>
+              <a:t>Objectif secondaire : implémenter les fonctions essentielles d’un chat</a:t>
+            </a:r>
+          </a:p>
+        </p:txBody>
+      </p:sp>
+    </p:spTree>
+    <p:extLst>
+      <p:ext uri="{BB962C8B-B14F-4D97-AF65-F5344CB8AC3E}">
+        <p14:creationId xmlns:p14="http://schemas.microsoft.com/office/powerpoint/2010/main" val="1385726154"/>
+      </p:ext>
+    </p:extLst>
+  </p:cSld>
+  <p:clrMapOvr>
+    <a:masterClrMapping/>
+  </p:clrMapOvr>
+</p:sld>
+</file>
+
+<file path=ppt/slides/slide12.xml><?xml version="1.0" encoding="utf-8"?>
+<p:sld xmlns:a="http://schemas.openxmlformats.org/drawingml/2006/main" xmlns:r="http://schemas.openxmlformats.org/officeDocument/2006/relationships" xmlns:p="http://schemas.openxmlformats.org/presentationml/2006/main">
+  <p:cSld>
+    <p:spTree>
+      <p:nvGrpSpPr>
+        <p:cNvPr id="1" name=""/>
+        <p:cNvGrpSpPr/>
+        <p:nvPr/>
+      </p:nvGrpSpPr>
+      <p:grpSpPr>
+        <a:xfrm>
+          <a:off x="0" y="0"/>
+          <a:ext cx="0" cy="0"/>
+          <a:chOff x="0" y="0"/>
+          <a:chExt cx="0" cy="0"/>
+        </a:xfrm>
+      </p:grpSpPr>
+      <p:sp>
+        <p:nvSpPr>
+          <p:cNvPr id="2" name="Titre 1">
+            <a:extLst>
+              <a:ext uri="{FF2B5EF4-FFF2-40B4-BE49-F238E27FC236}">
+                <a16:creationId xmlns:a16="http://schemas.microsoft.com/office/drawing/2014/main" id="{F034CE1F-ADF4-4B23-A222-E31B5A268960}"/>
+              </a:ext>
+            </a:extLst>
+          </p:cNvPr>
+          <p:cNvSpPr>
+            <a:spLocks noGrp="1"/>
+          </p:cNvSpPr>
+          <p:nvPr>
+            <p:ph type="title"/>
+          </p:nvPr>
+        </p:nvSpPr>
+        <p:spPr/>
+        <p:txBody>
+          <a:bodyPr/>
+          <a:lstStyle/>
+          <a:p>
+            <a:pPr algn="ctr"/>
+            <a:r>
+              <a:rPr lang="fr-FR" dirty="0">
+                <a:latin typeface="Helvetica-Light" panose="020B0400000000000000" pitchFamily="34" charset="0"/>
+              </a:rPr>
+              <a:t>Possibilité d’évolution</a:t>
+            </a:r>
+          </a:p>
+        </p:txBody>
+      </p:sp>
+      <p:sp>
+        <p:nvSpPr>
+          <p:cNvPr id="3" name="Espace réservé du contenu 2">
+            <a:extLst>
+              <a:ext uri="{FF2B5EF4-FFF2-40B4-BE49-F238E27FC236}">
+                <a16:creationId xmlns:a16="http://schemas.microsoft.com/office/drawing/2014/main" id="{BAAFEF82-5000-44C5-9108-84BDA5757C28}"/>
+              </a:ext>
+            </a:extLst>
+          </p:cNvPr>
+          <p:cNvSpPr>
+            <a:spLocks noGrp="1"/>
+          </p:cNvSpPr>
+          <p:nvPr>
+            <p:ph idx="1"/>
+          </p:nvPr>
+        </p:nvSpPr>
+        <p:spPr/>
+        <p:txBody>
+          <a:bodyPr/>
+          <a:lstStyle/>
+          <a:p>
+            <a:r>
+              <a:rPr lang="fr-FR" dirty="0">
+                <a:latin typeface="Helvetica-Light" panose="020B0400000000000000" pitchFamily="34" charset="0"/>
+              </a:rPr>
+              <a:t>L’appel audio</a:t>
+            </a:r>
+          </a:p>
+          <a:p>
+            <a:r>
+              <a:rPr lang="fr-FR" dirty="0">
+                <a:latin typeface="Helvetica-Light" panose="020B0400000000000000" pitchFamily="34" charset="0"/>
+              </a:rPr>
+              <a:t>L’appel vidéo avec son</a:t>
+            </a:r>
+          </a:p>
+          <a:p>
+            <a:r>
+              <a:rPr lang="fr-FR" dirty="0">
+                <a:latin typeface="Helvetica-Light" panose="020B0400000000000000" pitchFamily="34" charset="0"/>
+              </a:rPr>
+              <a:t>Partage de vidéo</a:t>
+            </a:r>
+          </a:p>
+          <a:p>
+            <a:r>
+              <a:rPr lang="fr-FR" dirty="0">
+                <a:latin typeface="Helvetica-Light" panose="020B0400000000000000" pitchFamily="34" charset="0"/>
+              </a:rPr>
+              <a:t>Ajout de mini-jeux</a:t>
+            </a:r>
+          </a:p>
+          <a:p>
+            <a:r>
+              <a:rPr lang="fr-FR" dirty="0">
+                <a:latin typeface="Helvetica-Light" panose="020B0400000000000000" pitchFamily="34" charset="0"/>
+              </a:rPr>
+              <a:t>Chat de groupe</a:t>
+            </a:r>
+          </a:p>
+          <a:p>
+            <a:r>
+              <a:rPr lang="fr-FR" dirty="0">
+                <a:latin typeface="Helvetica-Light" panose="020B0400000000000000" pitchFamily="34" charset="0"/>
+              </a:rPr>
+              <a:t>Cryptage des messages de bout en bout</a:t>
+            </a:r>
+          </a:p>
+          <a:p>
+            <a:r>
+              <a:rPr lang="fr-FR" dirty="0">
+                <a:latin typeface="Helvetica-Light" panose="020B0400000000000000" pitchFamily="34" charset="0"/>
+              </a:rPr>
+              <a:t>Possibilité de changer de nom d’utilisateur</a:t>
+            </a:r>
+          </a:p>
+        </p:txBody>
+      </p:sp>
+    </p:spTree>
+    <p:extLst>
+      <p:ext uri="{BB962C8B-B14F-4D97-AF65-F5344CB8AC3E}">
+        <p14:creationId xmlns:p14="http://schemas.microsoft.com/office/powerpoint/2010/main" val="118572163"/>
       </p:ext>
     </p:extLst>
   </p:cSld>
@@ -3570,7 +3941,9 @@
           <a:p>
             <a:pPr algn="ctr"/>
             <a:r>
-              <a:rPr lang="fr-FR" dirty="0"/>
+              <a:rPr lang="fr-FR" dirty="0">
+                <a:latin typeface="Helvetica-Light" panose="020B0400000000000000" pitchFamily="34" charset="0"/>
+              </a:rPr>
               <a:t>Le projet</a:t>
             </a:r>
           </a:p>
@@ -3600,30 +3973,52 @@
           <a:lstStyle/>
           <a:p>
             <a:r>
-              <a:rPr lang="fr-FR" dirty="0"/>
-              <a:t>Chat éphémère, de proximité</a:t>
-            </a:r>
-          </a:p>
-          <a:p>
-            <a:r>
-              <a:rPr lang="fr-FR" dirty="0"/>
+              <a:rPr lang="fr-FR" dirty="0">
+                <a:latin typeface="Helvetica-Light" panose="020B0400000000000000" pitchFamily="34" charset="0"/>
+              </a:rPr>
+              <a:t>Chat éphémère, de proximité, basé sur le Framework </a:t>
+            </a:r>
+            <a:r>
+              <a:rPr lang="fr-FR" dirty="0" err="1">
+                <a:latin typeface="Helvetica-Light" panose="020B0400000000000000" pitchFamily="34" charset="0"/>
+              </a:rPr>
+              <a:t>MultipeerConnectivity</a:t>
+            </a:r>
+            <a:r>
+              <a:rPr lang="fr-FR" dirty="0">
+                <a:latin typeface="Helvetica-Light" panose="020B0400000000000000" pitchFamily="34" charset="0"/>
+              </a:rPr>
+              <a:t>, compatible Mac, iPhone et tout autre équipement Apple</a:t>
+            </a:r>
+          </a:p>
+          <a:p>
+            <a:r>
+              <a:rPr lang="fr-FR" dirty="0">
+                <a:latin typeface="Helvetica-Light" panose="020B0400000000000000" pitchFamily="34" charset="0"/>
+              </a:rPr>
               <a:t>Partage entre amis</a:t>
             </a:r>
           </a:p>
           <a:p>
             <a:r>
-              <a:rPr lang="fr-FR" dirty="0"/>
+              <a:rPr lang="fr-FR" dirty="0">
+                <a:latin typeface="Helvetica-Light" panose="020B0400000000000000" pitchFamily="34" charset="0"/>
+              </a:rPr>
               <a:t>Appel vidéo</a:t>
             </a:r>
           </a:p>
           <a:p>
-            <a:endParaRPr lang="fr-FR" dirty="0"/>
+            <a:endParaRPr lang="fr-FR" dirty="0">
+              <a:latin typeface="Helvetica-Light" panose="020B0400000000000000" pitchFamily="34" charset="0"/>
+            </a:endParaRPr>
           </a:p>
           <a:p>
             <a:pPr marL="0" indent="0">
               <a:buNone/>
             </a:pPr>
-            <a:endParaRPr lang="fr-FR" dirty="0"/>
+            <a:endParaRPr lang="fr-FR" dirty="0">
+              <a:latin typeface="Helvetica-Light" panose="020B0400000000000000" pitchFamily="34" charset="0"/>
+            </a:endParaRPr>
           </a:p>
         </p:txBody>
       </p:sp>
@@ -3680,7 +4075,9 @@
           <a:p>
             <a:pPr algn="ctr"/>
             <a:r>
-              <a:rPr lang="fr-FR" dirty="0"/>
+              <a:rPr lang="fr-FR" dirty="0">
+                <a:latin typeface="Helvetica-Light" panose="020B0400000000000000" pitchFamily="34" charset="0"/>
+              </a:rPr>
               <a:t>Le projet</a:t>
             </a:r>
           </a:p>
@@ -3710,34 +4107,48 @@
           <a:lstStyle/>
           <a:p>
             <a:r>
-              <a:rPr lang="fr-FR" dirty="0"/>
+              <a:rPr lang="fr-FR" dirty="0">
+                <a:latin typeface="Helvetica-Light" panose="020B0400000000000000" pitchFamily="34" charset="0"/>
+              </a:rPr>
               <a:t>Principal </a:t>
             </a:r>
             <a:r>
-              <a:rPr lang="fr-FR" dirty="0" err="1"/>
+              <a:rPr lang="fr-FR" dirty="0" err="1">
+                <a:latin typeface="Helvetica-Light" panose="020B0400000000000000" pitchFamily="34" charset="0"/>
+              </a:rPr>
               <a:t>framework</a:t>
             </a:r>
             <a:r>
-              <a:rPr lang="fr-FR" dirty="0"/>
+              <a:rPr lang="fr-FR" dirty="0">
+                <a:latin typeface="Helvetica-Light" panose="020B0400000000000000" pitchFamily="34" charset="0"/>
+              </a:rPr>
               <a:t> : </a:t>
             </a:r>
             <a:r>
-              <a:rPr lang="fr-FR" dirty="0" err="1"/>
+              <a:rPr lang="fr-FR" dirty="0" err="1">
+                <a:latin typeface="Helvetica-Light" panose="020B0400000000000000" pitchFamily="34" charset="0"/>
+              </a:rPr>
               <a:t>MultipeerConnectivity</a:t>
             </a:r>
-            <a:endParaRPr lang="fr-FR" dirty="0"/>
-          </a:p>
-          <a:p>
-            <a:r>
-              <a:rPr lang="fr-FR" dirty="0"/>
-              <a:t>Framework qui permet la découverte d’appareils aux alentours (Bluetooth) ou connectés au même réseau Wi-Fi</a:t>
+            <a:endParaRPr lang="fr-FR" dirty="0">
+              <a:latin typeface="Helvetica-Light" panose="020B0400000000000000" pitchFamily="34" charset="0"/>
+            </a:endParaRPr>
+          </a:p>
+          <a:p>
+            <a:r>
+              <a:rPr lang="fr-FR" dirty="0">
+                <a:latin typeface="Helvetica-Light" panose="020B0400000000000000" pitchFamily="34" charset="0"/>
+              </a:rPr>
+              <a:t>Framework qui permet la découverte d’appareils à proximité alentours (Bluetooth) ou connectés au même réseau Wi-Fi ou encore le NFC</a:t>
             </a:r>
           </a:p>
           <a:p>
             <a:pPr marL="0" indent="0">
               <a:buNone/>
             </a:pPr>
-            <a:endParaRPr lang="fr-FR" dirty="0"/>
+            <a:endParaRPr lang="fr-FR" dirty="0">
+              <a:latin typeface="Helvetica-Light" panose="020B0400000000000000" pitchFamily="34" charset="0"/>
+            </a:endParaRPr>
           </a:p>
         </p:txBody>
       </p:sp>
@@ -3794,7 +4205,9 @@
           <a:p>
             <a:pPr algn="ctr"/>
             <a:r>
-              <a:rPr lang="fr-FR" dirty="0"/>
+              <a:rPr lang="fr-FR" dirty="0">
+                <a:latin typeface="Helvetica-Light" panose="020B0400000000000000" pitchFamily="34" charset="0"/>
+              </a:rPr>
               <a:t>L’idée derrière ce projet</a:t>
             </a:r>
           </a:p>
@@ -3824,21 +4237,35 @@
           <a:lstStyle/>
           <a:p>
             <a:r>
-              <a:rPr lang="fr-FR" dirty="0"/>
+              <a:rPr lang="fr-FR" dirty="0">
+                <a:latin typeface="Helvetica-Light" panose="020B0400000000000000" pitchFamily="34" charset="0"/>
+              </a:rPr>
               <a:t>Parler sans que l’on soit enregistré</a:t>
             </a:r>
           </a:p>
           <a:p>
             <a:r>
-              <a:rPr lang="fr-FR" dirty="0"/>
-              <a:t>Faire des rencontres sans que personne le sache</a:t>
-            </a:r>
-          </a:p>
-          <a:p>
-            <a:pPr marL="0" indent="0">
-              <a:buNone/>
-            </a:pPr>
-            <a:endParaRPr lang="fr-FR" dirty="0"/>
+              <a:rPr lang="fr-FR" dirty="0">
+                <a:latin typeface="Helvetica-Light" panose="020B0400000000000000" pitchFamily="34" charset="0"/>
+              </a:rPr>
+              <a:t>Faire des rencontres</a:t>
+            </a:r>
+          </a:p>
+          <a:p>
+            <a:r>
+              <a:rPr lang="fr-FR" dirty="0">
+                <a:latin typeface="Helvetica-Light" panose="020B0400000000000000" pitchFamily="34" charset="0"/>
+              </a:rPr>
+              <a:t>Avoir les fonctions essentielles d'un chat, qui ici, a l'avantage d'être éphémère</a:t>
+            </a:r>
+          </a:p>
+          <a:p>
+            <a:r>
+              <a:rPr lang="fr-FR" dirty="0">
+                <a:latin typeface="Helvetica-Light" panose="020B0400000000000000" pitchFamily="34" charset="0"/>
+              </a:rPr>
+              <a:t>Connectivité qui ne nécessite pas de connexion internet</a:t>
+            </a:r>
           </a:p>
         </p:txBody>
       </p:sp>
@@ -3895,7 +4322,9 @@
           <a:p>
             <a:pPr algn="ctr"/>
             <a:r>
-              <a:rPr lang="fr-FR" dirty="0"/>
+              <a:rPr lang="fr-FR" dirty="0">
+                <a:latin typeface="Helvetica-Light" panose="020B0400000000000000" pitchFamily="34" charset="0"/>
+              </a:rPr>
               <a:t>Points forts</a:t>
             </a:r>
           </a:p>
@@ -3922,7 +4351,36 @@
           <a:bodyPr/>
           <a:lstStyle/>
           <a:p>
-            <a:endParaRPr lang="fr-FR" dirty="0"/>
+            <a:r>
+              <a:rPr lang="fr-FR" dirty="0">
+                <a:latin typeface="Helvetica-Light" panose="020B0400000000000000" pitchFamily="34" charset="0"/>
+              </a:rPr>
+              <a:t>Pas besoin de connexion internet</a:t>
+            </a:r>
+          </a:p>
+          <a:p>
+            <a:r>
+              <a:rPr lang="fr-FR" dirty="0">
+                <a:latin typeface="Helvetica-Light" panose="020B0400000000000000" pitchFamily="34" charset="0"/>
+              </a:rPr>
+              <a:t>Chat éphémère </a:t>
+            </a:r>
+          </a:p>
+          <a:p>
+            <a:r>
+              <a:rPr lang="fr-FR" dirty="0">
+                <a:latin typeface="Helvetica-Light" panose="020B0400000000000000" pitchFamily="34" charset="0"/>
+              </a:rPr>
+              <a:t>Fin de discussion provoque une déconnexion du chat pour les utilisateurs</a:t>
+            </a:r>
+          </a:p>
+          <a:p>
+            <a:r>
+              <a:rPr lang="fr-FR" dirty="0">
+                <a:latin typeface="Helvetica-Light" panose="020B0400000000000000" pitchFamily="34" charset="0"/>
+              </a:rPr>
+              <a:t>Communication en temps réel</a:t>
+            </a:r>
           </a:p>
         </p:txBody>
       </p:sp>
@@ -3961,7 +4419,7 @@
           <p:cNvPr id="2" name="Titre 1">
             <a:extLst>
               <a:ext uri="{FF2B5EF4-FFF2-40B4-BE49-F238E27FC236}">
-                <a16:creationId xmlns:a16="http://schemas.microsoft.com/office/drawing/2014/main" id="{ABD0262C-D8DE-4C52-A37C-0E08629F491D}"/>
+                <a16:creationId xmlns:a16="http://schemas.microsoft.com/office/drawing/2014/main" id="{D0B0AC82-1BA4-4F15-8FF4-079A6CFA9750}"/>
               </a:ext>
             </a:extLst>
           </p:cNvPr>
@@ -3980,7 +4438,7 @@
             <a:pPr algn="ctr"/>
             <a:r>
               <a:rPr lang="fr-FR" dirty="0"/>
-              <a:t>Intérêts</a:t>
+              <a:t>Fonctionnalités</a:t>
             </a:r>
           </a:p>
         </p:txBody>
@@ -3990,7 +4448,7 @@
           <p:cNvPr id="3" name="Espace réservé du contenu 2">
             <a:extLst>
               <a:ext uri="{FF2B5EF4-FFF2-40B4-BE49-F238E27FC236}">
-                <a16:creationId xmlns:a16="http://schemas.microsoft.com/office/drawing/2014/main" id="{B97000C7-769B-4C59-A947-B9CAB3D7756B}"/>
+                <a16:creationId xmlns:a16="http://schemas.microsoft.com/office/drawing/2014/main" id="{74D41573-F310-4C80-8827-7ED40DEB453B}"/>
               </a:ext>
             </a:extLst>
           </p:cNvPr>
@@ -4006,23 +4464,75 @@
           <a:bodyPr/>
           <a:lstStyle/>
           <a:p>
-            <a:r>
-              <a:rPr lang="fr-FR" dirty="0"/>
-              <a:t>Rencontre des personnes aux alentours</a:t>
-            </a:r>
-          </a:p>
-          <a:p>
-            <a:r>
-              <a:rPr lang="fr-FR" dirty="0"/>
-              <a:t>Socialiser vos nouveaux arrivants???</a:t>
-            </a:r>
-          </a:p>
-        </p:txBody>
-      </p:sp>
+            <a:endParaRPr lang="fr-FR" dirty="0">
+              <a:latin typeface="Helvetica-Light" panose="020B0400000000000000" pitchFamily="34" charset="0"/>
+            </a:endParaRPr>
+          </a:p>
+          <a:p>
+            <a:endParaRPr lang="fr-FR" dirty="0">
+              <a:latin typeface="Helvetica-Light" panose="020B0400000000000000" pitchFamily="34" charset="0"/>
+            </a:endParaRPr>
+          </a:p>
+          <a:p>
+            <a:endParaRPr lang="fr-FR" dirty="0">
+              <a:latin typeface="Helvetica-Light" panose="020B0400000000000000" pitchFamily="34" charset="0"/>
+            </a:endParaRPr>
+          </a:p>
+          <a:p>
+            <a:r>
+              <a:rPr lang="fr-FR" dirty="0">
+                <a:latin typeface="Helvetica-Light" panose="020B0400000000000000" pitchFamily="34" charset="0"/>
+              </a:rPr>
+              <a:t>Envoi de message</a:t>
+            </a:r>
+          </a:p>
+          <a:p>
+            <a:endParaRPr lang="fr-FR" dirty="0">
+              <a:latin typeface="Helvetica-Light" panose="020B0400000000000000" pitchFamily="34" charset="0"/>
+            </a:endParaRPr>
+          </a:p>
+        </p:txBody>
+      </p:sp>
+      <p:pic>
+        <p:nvPicPr>
+          <p:cNvPr id="5" name="Image 4">
+            <a:extLst>
+              <a:ext uri="{FF2B5EF4-FFF2-40B4-BE49-F238E27FC236}">
+                <a16:creationId xmlns:a16="http://schemas.microsoft.com/office/drawing/2014/main" id="{F1579BAB-4F70-4183-82F1-295BB8F70F19}"/>
+              </a:ext>
+            </a:extLst>
+          </p:cNvPr>
+          <p:cNvPicPr>
+            <a:picLocks noChangeAspect="1"/>
+          </p:cNvPicPr>
+          <p:nvPr/>
+        </p:nvPicPr>
+        <p:blipFill>
+          <a:blip r:embed="rId2">
+            <a:extLst>
+              <a:ext uri="{28A0092B-C50C-407E-A947-70E740481C1C}">
+                <a14:useLocalDpi xmlns:a14="http://schemas.microsoft.com/office/drawing/2010/main" val="0"/>
+              </a:ext>
+            </a:extLst>
+          </a:blip>
+          <a:stretch>
+            <a:fillRect/>
+          </a:stretch>
+        </p:blipFill>
+        <p:spPr>
+          <a:xfrm>
+            <a:off x="6398368" y="1596197"/>
+            <a:ext cx="2395657" cy="4896678"/>
+          </a:xfrm>
+          <a:prstGeom prst="rect">
+            <a:avLst/>
+          </a:prstGeom>
+        </p:spPr>
+      </p:pic>
     </p:spTree>
     <p:extLst>
       <p:ext uri="{BB962C8B-B14F-4D97-AF65-F5344CB8AC3E}">
-        <p14:creationId xmlns:p14="http://schemas.microsoft.com/office/powerpoint/2010/main" val="1385726154"/>
+        <p14:creationId xmlns:p14="http://schemas.microsoft.com/office/powerpoint/2010/main" val="2224913794"/>
       </p:ext>
     </p:extLst>
   </p:cSld>
@@ -4054,7 +4564,7 @@
           <p:cNvPr id="2" name="Titre 1">
             <a:extLst>
               <a:ext uri="{FF2B5EF4-FFF2-40B4-BE49-F238E27FC236}">
-                <a16:creationId xmlns:a16="http://schemas.microsoft.com/office/drawing/2014/main" id="{F034CE1F-ADF4-4B23-A222-E31B5A268960}"/>
+                <a16:creationId xmlns:a16="http://schemas.microsoft.com/office/drawing/2014/main" id="{D0B0AC82-1BA4-4F15-8FF4-079A6CFA9750}"/>
               </a:ext>
             </a:extLst>
           </p:cNvPr>
@@ -4073,7 +4583,7 @@
             <a:pPr algn="ctr"/>
             <a:r>
               <a:rPr lang="fr-FR" dirty="0"/>
-              <a:t>Possibilité d’évolution</a:t>
+              <a:t>Fonctionnalités</a:t>
             </a:r>
           </a:p>
         </p:txBody>
@@ -4083,7 +4593,7 @@
           <p:cNvPr id="3" name="Espace réservé du contenu 2">
             <a:extLst>
               <a:ext uri="{FF2B5EF4-FFF2-40B4-BE49-F238E27FC236}">
-                <a16:creationId xmlns:a16="http://schemas.microsoft.com/office/drawing/2014/main" id="{BAAFEF82-5000-44C5-9108-84BDA5757C28}"/>
+                <a16:creationId xmlns:a16="http://schemas.microsoft.com/office/drawing/2014/main" id="{74D41573-F310-4C80-8827-7ED40DEB453B}"/>
               </a:ext>
             </a:extLst>
           </p:cNvPr>
@@ -4100,36 +4610,253 @@
           <a:lstStyle/>
           <a:p>
             <a:r>
-              <a:rPr lang="fr-FR" dirty="0"/>
-              <a:t>Rajouter le </a:t>
-            </a:r>
-            <a:r>
-              <a:rPr lang="fr-FR" dirty="0" err="1"/>
-              <a:t>voice</a:t>
-            </a:r>
-            <a:r>
-              <a:rPr lang="fr-FR" dirty="0"/>
-              <a:t> record lors du chat vidéo</a:t>
-            </a:r>
-          </a:p>
-          <a:p>
-            <a:r>
-              <a:rPr lang="fr-FR" dirty="0"/>
-              <a:t>Partage de vidéo</a:t>
-            </a:r>
-          </a:p>
-          <a:p>
-            <a:pPr marL="0" indent="0">
-              <a:buNone/>
-            </a:pPr>
-            <a:endParaRPr lang="fr-FR" dirty="0"/>
+              <a:rPr lang="fr-FR" dirty="0">
+                <a:latin typeface="Helvetica-Light" panose="020B0400000000000000" pitchFamily="34" charset="0"/>
+              </a:rPr>
+              <a:t>Ajouter, modifier, supprimer son avatar</a:t>
+            </a:r>
           </a:p>
         </p:txBody>
       </p:sp>
     </p:spTree>
     <p:extLst>
       <p:ext uri="{BB962C8B-B14F-4D97-AF65-F5344CB8AC3E}">
-        <p14:creationId xmlns:p14="http://schemas.microsoft.com/office/powerpoint/2010/main" val="118572163"/>
+        <p14:creationId xmlns:p14="http://schemas.microsoft.com/office/powerpoint/2010/main" val="1744349762"/>
+      </p:ext>
+    </p:extLst>
+  </p:cSld>
+  <p:clrMapOvr>
+    <a:masterClrMapping/>
+  </p:clrMapOvr>
+</p:sld>
+</file>
+
+<file path=ppt/slides/slide8.xml><?xml version="1.0" encoding="utf-8"?>
+<p:sld xmlns:a="http://schemas.openxmlformats.org/drawingml/2006/main" xmlns:r="http://schemas.openxmlformats.org/officeDocument/2006/relationships" xmlns:p="http://schemas.openxmlformats.org/presentationml/2006/main">
+  <p:cSld>
+    <p:spTree>
+      <p:nvGrpSpPr>
+        <p:cNvPr id="1" name=""/>
+        <p:cNvGrpSpPr/>
+        <p:nvPr/>
+      </p:nvGrpSpPr>
+      <p:grpSpPr>
+        <a:xfrm>
+          <a:off x="0" y="0"/>
+          <a:ext cx="0" cy="0"/>
+          <a:chOff x="0" y="0"/>
+          <a:chExt cx="0" cy="0"/>
+        </a:xfrm>
+      </p:grpSpPr>
+      <p:sp>
+        <p:nvSpPr>
+          <p:cNvPr id="2" name="Titre 1">
+            <a:extLst>
+              <a:ext uri="{FF2B5EF4-FFF2-40B4-BE49-F238E27FC236}">
+                <a16:creationId xmlns:a16="http://schemas.microsoft.com/office/drawing/2014/main" id="{D0B0AC82-1BA4-4F15-8FF4-079A6CFA9750}"/>
+              </a:ext>
+            </a:extLst>
+          </p:cNvPr>
+          <p:cNvSpPr>
+            <a:spLocks noGrp="1"/>
+          </p:cNvSpPr>
+          <p:nvPr>
+            <p:ph type="title"/>
+          </p:nvPr>
+        </p:nvSpPr>
+        <p:spPr/>
+        <p:txBody>
+          <a:bodyPr/>
+          <a:lstStyle/>
+          <a:p>
+            <a:pPr algn="ctr"/>
+            <a:r>
+              <a:rPr lang="fr-FR" dirty="0"/>
+              <a:t>Fonctionnalités</a:t>
+            </a:r>
+          </a:p>
+        </p:txBody>
+      </p:sp>
+      <p:sp>
+        <p:nvSpPr>
+          <p:cNvPr id="3" name="Espace réservé du contenu 2">
+            <a:extLst>
+              <a:ext uri="{FF2B5EF4-FFF2-40B4-BE49-F238E27FC236}">
+                <a16:creationId xmlns:a16="http://schemas.microsoft.com/office/drawing/2014/main" id="{74D41573-F310-4C80-8827-7ED40DEB453B}"/>
+              </a:ext>
+            </a:extLst>
+          </p:cNvPr>
+          <p:cNvSpPr>
+            <a:spLocks noGrp="1"/>
+          </p:cNvSpPr>
+          <p:nvPr>
+            <p:ph idx="1"/>
+          </p:nvPr>
+        </p:nvSpPr>
+        <p:spPr/>
+        <p:txBody>
+          <a:bodyPr/>
+          <a:lstStyle/>
+          <a:p>
+            <a:r>
+              <a:rPr lang="fr-FR" dirty="0">
+                <a:latin typeface="Helvetica-Light" panose="020B0400000000000000" pitchFamily="34" charset="0"/>
+              </a:rPr>
+              <a:t>Envoi d’une image via galerie ou caméra</a:t>
+            </a:r>
+          </a:p>
+        </p:txBody>
+      </p:sp>
+    </p:spTree>
+    <p:extLst>
+      <p:ext uri="{BB962C8B-B14F-4D97-AF65-F5344CB8AC3E}">
+        <p14:creationId xmlns:p14="http://schemas.microsoft.com/office/powerpoint/2010/main" val="3556748884"/>
+      </p:ext>
+    </p:extLst>
+  </p:cSld>
+  <p:clrMapOvr>
+    <a:masterClrMapping/>
+  </p:clrMapOvr>
+</p:sld>
+</file>
+
+<file path=ppt/slides/slide9.xml><?xml version="1.0" encoding="utf-8"?>
+<p:sld xmlns:a="http://schemas.openxmlformats.org/drawingml/2006/main" xmlns:r="http://schemas.openxmlformats.org/officeDocument/2006/relationships" xmlns:p="http://schemas.openxmlformats.org/presentationml/2006/main">
+  <p:cSld>
+    <p:spTree>
+      <p:nvGrpSpPr>
+        <p:cNvPr id="1" name=""/>
+        <p:cNvGrpSpPr/>
+        <p:nvPr/>
+      </p:nvGrpSpPr>
+      <p:grpSpPr>
+        <a:xfrm>
+          <a:off x="0" y="0"/>
+          <a:ext cx="0" cy="0"/>
+          <a:chOff x="0" y="0"/>
+          <a:chExt cx="0" cy="0"/>
+        </a:xfrm>
+      </p:grpSpPr>
+      <p:sp>
+        <p:nvSpPr>
+          <p:cNvPr id="2" name="Titre 1">
+            <a:extLst>
+              <a:ext uri="{FF2B5EF4-FFF2-40B4-BE49-F238E27FC236}">
+                <a16:creationId xmlns:a16="http://schemas.microsoft.com/office/drawing/2014/main" id="{D0B0AC82-1BA4-4F15-8FF4-079A6CFA9750}"/>
+              </a:ext>
+            </a:extLst>
+          </p:cNvPr>
+          <p:cNvSpPr>
+            <a:spLocks noGrp="1"/>
+          </p:cNvSpPr>
+          <p:nvPr>
+            <p:ph type="title"/>
+          </p:nvPr>
+        </p:nvSpPr>
+        <p:spPr/>
+        <p:txBody>
+          <a:bodyPr/>
+          <a:lstStyle/>
+          <a:p>
+            <a:pPr algn="ctr"/>
+            <a:r>
+              <a:rPr lang="fr-FR" dirty="0"/>
+              <a:t>Fonctionnalités</a:t>
+            </a:r>
+          </a:p>
+        </p:txBody>
+      </p:sp>
+      <p:sp>
+        <p:nvSpPr>
+          <p:cNvPr id="3" name="Espace réservé du contenu 2">
+            <a:extLst>
+              <a:ext uri="{FF2B5EF4-FFF2-40B4-BE49-F238E27FC236}">
+                <a16:creationId xmlns:a16="http://schemas.microsoft.com/office/drawing/2014/main" id="{74D41573-F310-4C80-8827-7ED40DEB453B}"/>
+              </a:ext>
+            </a:extLst>
+          </p:cNvPr>
+          <p:cNvSpPr>
+            <a:spLocks noGrp="1"/>
+          </p:cNvSpPr>
+          <p:nvPr>
+            <p:ph idx="1"/>
+          </p:nvPr>
+        </p:nvSpPr>
+        <p:spPr/>
+        <p:txBody>
+          <a:bodyPr/>
+          <a:lstStyle/>
+          <a:p>
+            <a:endParaRPr lang="fr-FR" dirty="0">
+              <a:latin typeface="Helvetica-Light" panose="020B0400000000000000" pitchFamily="34" charset="0"/>
+            </a:endParaRPr>
+          </a:p>
+          <a:p>
+            <a:endParaRPr lang="fr-FR" dirty="0">
+              <a:latin typeface="Helvetica-Light" panose="020B0400000000000000" pitchFamily="34" charset="0"/>
+            </a:endParaRPr>
+          </a:p>
+          <a:p>
+            <a:endParaRPr lang="fr-FR">
+              <a:latin typeface="Helvetica-Light" panose="020B0400000000000000" pitchFamily="34" charset="0"/>
+            </a:endParaRPr>
+          </a:p>
+          <a:p>
+            <a:r>
+              <a:rPr lang="fr-FR">
+                <a:latin typeface="Helvetica-Light" panose="020B0400000000000000" pitchFamily="34" charset="0"/>
+              </a:rPr>
+              <a:t>Partage </a:t>
+            </a:r>
+            <a:r>
+              <a:rPr lang="fr-FR" dirty="0">
+                <a:latin typeface="Helvetica-Light" panose="020B0400000000000000" pitchFamily="34" charset="0"/>
+              </a:rPr>
+              <a:t>de localisation</a:t>
+            </a:r>
+          </a:p>
+        </p:txBody>
+      </p:sp>
+      <p:pic>
+        <p:nvPicPr>
+          <p:cNvPr id="5" name="Image 4">
+            <a:extLst>
+              <a:ext uri="{FF2B5EF4-FFF2-40B4-BE49-F238E27FC236}">
+                <a16:creationId xmlns:a16="http://schemas.microsoft.com/office/drawing/2014/main" id="{67AC4C79-48F7-4591-8D1C-95A1BACFD167}"/>
+              </a:ext>
+            </a:extLst>
+          </p:cNvPr>
+          <p:cNvPicPr>
+            <a:picLocks noChangeAspect="1"/>
+          </p:cNvPicPr>
+          <p:nvPr/>
+        </p:nvPicPr>
+        <p:blipFill>
+          <a:blip r:embed="rId2">
+            <a:extLst>
+              <a:ext uri="{28A0092B-C50C-407E-A947-70E740481C1C}">
+                <a14:useLocalDpi xmlns:a14="http://schemas.microsoft.com/office/drawing/2010/main" val="0"/>
+              </a:ext>
+            </a:extLst>
+          </a:blip>
+          <a:stretch>
+            <a:fillRect/>
+          </a:stretch>
+        </p:blipFill>
+        <p:spPr>
+          <a:xfrm>
+            <a:off x="7285333" y="1690688"/>
+            <a:ext cx="2052031" cy="4194313"/>
+          </a:xfrm>
+          <a:prstGeom prst="rect">
+            <a:avLst/>
+          </a:prstGeom>
+        </p:spPr>
+      </p:pic>
+    </p:spTree>
+    <p:extLst>
+      <p:ext uri="{BB962C8B-B14F-4D97-AF65-F5344CB8AC3E}">
+        <p14:creationId xmlns:p14="http://schemas.microsoft.com/office/powerpoint/2010/main" val="297754459"/>
       </p:ext>
     </p:extLst>
   </p:cSld>

</xml_diff>